<commit_message>
Contextualização e protótipo da dashboard atualizados na apresentaçãp
</commit_message>
<xml_diff>
--- a/documentacao/Apresentação/SPRINT-2sem-01.pptx
+++ b/documentacao/Apresentação/SPRINT-2sem-01.pptx
@@ -5,17 +5,19 @@
     <p:sldMasterId id="2147483712" r:id="rId1"/>
   </p:sldMasterIdLst>
   <p:handoutMasterIdLst>
-    <p:handoutMasterId r:id="rId10"/>
+    <p:handoutMasterId r:id="rId12"/>
   </p:handoutMasterIdLst>
   <p:sldIdLst>
     <p:sldId id="256" r:id="rId2"/>
     <p:sldId id="257" r:id="rId3"/>
     <p:sldId id="284" r:id="rId4"/>
-    <p:sldId id="285" r:id="rId5"/>
-    <p:sldId id="286" r:id="rId6"/>
-    <p:sldId id="287" r:id="rId7"/>
-    <p:sldId id="262" r:id="rId8"/>
-    <p:sldId id="288" r:id="rId9"/>
+    <p:sldId id="290" r:id="rId5"/>
+    <p:sldId id="285" r:id="rId6"/>
+    <p:sldId id="286" r:id="rId7"/>
+    <p:sldId id="287" r:id="rId8"/>
+    <p:sldId id="289" r:id="rId9"/>
+    <p:sldId id="262" r:id="rId10"/>
+    <p:sldId id="288" r:id="rId11"/>
   </p:sldIdLst>
   <p:sldSz cx="14630400" cy="8229600"/>
   <p:notesSz cx="6858000" cy="9144000"/>
@@ -219,7 +221,7 @@
           <a:p>
             <a:fld id="{A16AB2ED-1336-44A6-A234-81CBA8E79B13}" type="datetimeFigureOut">
               <a:rPr lang="pt-BR" smtClean="0"/>
-              <a:t>08/09/2020</a:t>
+              <a:t>09/09/2020</a:t>
             </a:fld>
             <a:endParaRPr lang="pt-BR"/>
           </a:p>
@@ -461,7 +463,7 @@
           <a:p>
             <a:fld id="{84539BEB-3F62-43AF-B85C-9C6F6BC99164}" type="datetimeFigureOut">
               <a:rPr lang="pt-BR" smtClean="0"/>
-              <a:t>08/09/2020</a:t>
+              <a:t>09/09/2020</a:t>
             </a:fld>
             <a:endParaRPr lang="pt-BR"/>
           </a:p>
@@ -749,7 +751,7 @@
           <a:p>
             <a:fld id="{84539BEB-3F62-43AF-B85C-9C6F6BC99164}" type="datetimeFigureOut">
               <a:rPr lang="pt-BR" smtClean="0"/>
-              <a:t>08/09/2020</a:t>
+              <a:t>09/09/2020</a:t>
             </a:fld>
             <a:endParaRPr lang="pt-BR"/>
           </a:p>
@@ -947,7 +949,7 @@
           <a:p>
             <a:fld id="{84539BEB-3F62-43AF-B85C-9C6F6BC99164}" type="datetimeFigureOut">
               <a:rPr lang="pt-BR" smtClean="0"/>
-              <a:t>08/09/2020</a:t>
+              <a:t>09/09/2020</a:t>
             </a:fld>
             <a:endParaRPr lang="pt-BR"/>
           </a:p>
@@ -1155,7 +1157,7 @@
           <a:p>
             <a:fld id="{84539BEB-3F62-43AF-B85C-9C6F6BC99164}" type="datetimeFigureOut">
               <a:rPr lang="pt-BR" smtClean="0"/>
-              <a:t>08/09/2020</a:t>
+              <a:t>09/09/2020</a:t>
             </a:fld>
             <a:endParaRPr lang="pt-BR"/>
           </a:p>
@@ -1741,7 +1743,7 @@
           <a:p>
             <a:fld id="{84539BEB-3F62-43AF-B85C-9C6F6BC99164}" type="datetimeFigureOut">
               <a:rPr lang="pt-BR" smtClean="0"/>
-              <a:t>08/09/2020</a:t>
+              <a:t>09/09/2020</a:t>
             </a:fld>
             <a:endParaRPr lang="pt-BR"/>
           </a:p>
@@ -1882,7 +1884,7 @@
           <a:p>
             <a:fld id="{84539BEB-3F62-43AF-B85C-9C6F6BC99164}" type="datetimeFigureOut">
               <a:rPr lang="pt-BR" smtClean="0"/>
-              <a:t>08/09/2020</a:t>
+              <a:t>09/09/2020</a:t>
             </a:fld>
             <a:endParaRPr lang="pt-BR"/>
           </a:p>
@@ -2157,7 +2159,7 @@
           <a:p>
             <a:fld id="{84539BEB-3F62-43AF-B85C-9C6F6BC99164}" type="datetimeFigureOut">
               <a:rPr lang="pt-BR" smtClean="0"/>
-              <a:t>08/09/2020</a:t>
+              <a:t>09/09/2020</a:t>
             </a:fld>
             <a:endParaRPr lang="pt-BR"/>
           </a:p>
@@ -2422,7 +2424,7 @@
           <a:p>
             <a:fld id="{84539BEB-3F62-43AF-B85C-9C6F6BC99164}" type="datetimeFigureOut">
               <a:rPr lang="pt-BR" smtClean="0"/>
-              <a:t>08/09/2020</a:t>
+              <a:t>09/09/2020</a:t>
             </a:fld>
             <a:endParaRPr lang="pt-BR"/>
           </a:p>
@@ -2834,7 +2836,7 @@
           <a:p>
             <a:fld id="{84539BEB-3F62-43AF-B85C-9C6F6BC99164}" type="datetimeFigureOut">
               <a:rPr lang="pt-BR" smtClean="0"/>
-              <a:t>08/09/2020</a:t>
+              <a:t>09/09/2020</a:t>
             </a:fld>
             <a:endParaRPr lang="pt-BR"/>
           </a:p>
@@ -2975,7 +2977,7 @@
           <a:p>
             <a:fld id="{84539BEB-3F62-43AF-B85C-9C6F6BC99164}" type="datetimeFigureOut">
               <a:rPr lang="pt-BR" smtClean="0"/>
-              <a:t>08/09/2020</a:t>
+              <a:t>09/09/2020</a:t>
             </a:fld>
             <a:endParaRPr lang="pt-BR"/>
           </a:p>
@@ -3088,7 +3090,7 @@
           <a:p>
             <a:fld id="{84539BEB-3F62-43AF-B85C-9C6F6BC99164}" type="datetimeFigureOut">
               <a:rPr lang="pt-BR" smtClean="0"/>
-              <a:t>08/09/2020</a:t>
+              <a:t>09/09/2020</a:t>
             </a:fld>
             <a:endParaRPr lang="pt-BR"/>
           </a:p>
@@ -3399,7 +3401,7 @@
           <a:p>
             <a:fld id="{84539BEB-3F62-43AF-B85C-9C6F6BC99164}" type="datetimeFigureOut">
               <a:rPr lang="pt-BR" smtClean="0"/>
-              <a:t>08/09/2020</a:t>
+              <a:t>09/09/2020</a:t>
             </a:fld>
             <a:endParaRPr lang="pt-BR"/>
           </a:p>
@@ -3652,7 +3654,7 @@
           <a:p>
             <a:fld id="{84539BEB-3F62-43AF-B85C-9C6F6BC99164}" type="datetimeFigureOut">
               <a:rPr lang="pt-BR" smtClean="0"/>
-              <a:t>08/09/2020</a:t>
+              <a:t>09/09/2020</a:t>
             </a:fld>
             <a:endParaRPr lang="pt-BR"/>
           </a:p>
@@ -6935,6 +6937,232 @@
 </p:sld>
 </file>
 
+<file path=ppt/slides/slide10.xml><?xml version="1.0" encoding="utf-8"?>
+<p:sld xmlns:a="http://schemas.openxmlformats.org/drawingml/2006/main" xmlns:r="http://schemas.openxmlformats.org/officeDocument/2006/relationships" xmlns:p="http://schemas.openxmlformats.org/presentationml/2006/main">
+  <p:cSld>
+    <p:spTree>
+      <p:nvGrpSpPr>
+        <p:cNvPr id="1" name=""/>
+        <p:cNvGrpSpPr/>
+        <p:nvPr/>
+      </p:nvGrpSpPr>
+      <p:grpSpPr>
+        <a:xfrm>
+          <a:off x="0" y="0"/>
+          <a:ext cx="0" cy="0"/>
+          <a:chOff x="0" y="0"/>
+          <a:chExt cx="0" cy="0"/>
+        </a:xfrm>
+      </p:grpSpPr>
+      <p:sp>
+        <p:nvSpPr>
+          <p:cNvPr id="3" name="Retângulo: Cantos Arredondados 2">
+            <a:extLst>
+              <a:ext uri="{FF2B5EF4-FFF2-40B4-BE49-F238E27FC236}">
+                <a16:creationId xmlns:a16="http://schemas.microsoft.com/office/drawing/2014/main" id="{9C610460-61EB-432B-B176-8730516AE2A8}"/>
+              </a:ext>
+            </a:extLst>
+          </p:cNvPr>
+          <p:cNvSpPr/>
+          <p:nvPr/>
+        </p:nvSpPr>
+        <p:spPr>
+          <a:xfrm>
+            <a:off x="1446550" y="831953"/>
+            <a:ext cx="11737298" cy="6565692"/>
+          </a:xfrm>
+          <a:prstGeom prst="roundRect">
+            <a:avLst/>
+          </a:prstGeom>
+          <a:solidFill>
+            <a:schemeClr val="bg1"/>
+          </a:solidFill>
+          <a:ln>
+            <a:noFill/>
+          </a:ln>
+          <a:effectLst>
+            <a:innerShdw blurRad="63500">
+              <a:prstClr val="black">
+                <a:alpha val="25000"/>
+              </a:prstClr>
+            </a:innerShdw>
+          </a:effectLst>
+        </p:spPr>
+        <p:style>
+          <a:lnRef idx="2">
+            <a:schemeClr val="accent1">
+              <a:shade val="50000"/>
+            </a:schemeClr>
+          </a:lnRef>
+          <a:fillRef idx="1">
+            <a:schemeClr val="accent1"/>
+          </a:fillRef>
+          <a:effectRef idx="0">
+            <a:schemeClr val="accent1"/>
+          </a:effectRef>
+          <a:fontRef idx="minor">
+            <a:schemeClr val="lt1"/>
+          </a:fontRef>
+        </p:style>
+        <p:txBody>
+          <a:bodyPr rtlCol="0" anchor="ctr"/>
+          <a:lstStyle/>
+          <a:p>
+            <a:pPr algn="ctr"/>
+            <a:endParaRPr lang="pt-BR"/>
+          </a:p>
+        </p:txBody>
+      </p:sp>
+      <p:sp>
+        <p:nvSpPr>
+          <p:cNvPr id="10" name="CaixaDeTexto 9">
+            <a:extLst>
+              <a:ext uri="{FF2B5EF4-FFF2-40B4-BE49-F238E27FC236}">
+                <a16:creationId xmlns:a16="http://schemas.microsoft.com/office/drawing/2014/main" id="{9A5A89AA-6F45-4CF6-8028-690E52DBD958}"/>
+              </a:ext>
+            </a:extLst>
+          </p:cNvPr>
+          <p:cNvSpPr txBox="1"/>
+          <p:nvPr/>
+        </p:nvSpPr>
+        <p:spPr>
+          <a:xfrm>
+            <a:off x="0" y="5882311"/>
+            <a:ext cx="14630400" cy="1938992"/>
+          </a:xfrm>
+          <a:prstGeom prst="rect">
+            <a:avLst/>
+          </a:prstGeom>
+          <a:noFill/>
+        </p:spPr>
+        <p:txBody>
+          <a:bodyPr wrap="square" rtlCol="0">
+            <a:spAutoFit/>
+          </a:bodyPr>
+          <a:lstStyle/>
+          <a:p>
+            <a:pPr algn="ctr"/>
+            <a:r>
+              <a:rPr lang="pt-BR" sz="12000" b="1" dirty="0">
+                <a:gradFill>
+                  <a:gsLst>
+                    <a:gs pos="0">
+                      <a:srgbClr val="00F5A0"/>
+                    </a:gs>
+                    <a:gs pos="100000">
+                      <a:srgbClr val="00D9F5"/>
+                    </a:gs>
+                  </a:gsLst>
+                  <a:lin ang="16200000" scaled="1"/>
+                </a:gradFill>
+                <a:effectLst>
+                  <a:outerShdw blurRad="127000" dist="38100" dir="5400000" algn="t" rotWithShape="0">
+                    <a:prstClr val="black">
+                      <a:alpha val="0"/>
+                    </a:prstClr>
+                  </a:outerShdw>
+                </a:effectLst>
+                <a:latin typeface="Segoe UI" panose="020B0502040204020203" pitchFamily="34" charset="0"/>
+                <a:cs typeface="Segoe UI" panose="020B0502040204020203" pitchFamily="34" charset="0"/>
+              </a:rPr>
+              <a:t>API’S</a:t>
+            </a:r>
+          </a:p>
+        </p:txBody>
+      </p:sp>
+      <p:pic>
+        <p:nvPicPr>
+          <p:cNvPr id="1026" name="Picture 2" descr="Slack Review | PCMag">
+            <a:extLst>
+              <a:ext uri="{FF2B5EF4-FFF2-40B4-BE49-F238E27FC236}">
+                <a16:creationId xmlns:a16="http://schemas.microsoft.com/office/drawing/2014/main" id="{4824B348-E53B-4C3E-BA83-EA4767AA7B1A}"/>
+              </a:ext>
+            </a:extLst>
+          </p:cNvPr>
+          <p:cNvPicPr>
+            <a:picLocks noChangeAspect="1" noChangeArrowheads="1"/>
+          </p:cNvPicPr>
+          <p:nvPr/>
+        </p:nvPicPr>
+        <p:blipFill>
+          <a:blip r:embed="rId2">
+            <a:extLst>
+              <a:ext uri="{28A0092B-C50C-407E-A947-70E740481C1C}">
+                <a14:useLocalDpi xmlns:a14="http://schemas.microsoft.com/office/drawing/2010/main" val="0"/>
+              </a:ext>
+            </a:extLst>
+          </a:blip>
+          <a:srcRect/>
+          <a:stretch>
+            <a:fillRect/>
+          </a:stretch>
+        </p:blipFill>
+        <p:spPr bwMode="auto">
+          <a:xfrm>
+            <a:off x="2267996" y="2263671"/>
+            <a:ext cx="5047204" cy="2840588"/>
+          </a:xfrm>
+          <a:prstGeom prst="rect">
+            <a:avLst/>
+          </a:prstGeom>
+          <a:noFill/>
+          <a:extLst>
+            <a:ext uri="{909E8E84-426E-40DD-AFC4-6F175D3DCCD1}">
+              <a14:hiddenFill xmlns:a14="http://schemas.microsoft.com/office/drawing/2010/main">
+                <a:solidFill>
+                  <a:srgbClr val="FFFFFF"/>
+                </a:solidFill>
+              </a14:hiddenFill>
+            </a:ext>
+          </a:extLst>
+        </p:spPr>
+      </p:pic>
+      <p:pic>
+        <p:nvPicPr>
+          <p:cNvPr id="4" name="Imagem 3">
+            <a:extLst>
+              <a:ext uri="{FF2B5EF4-FFF2-40B4-BE49-F238E27FC236}">
+                <a16:creationId xmlns:a16="http://schemas.microsoft.com/office/drawing/2014/main" id="{8E2B5735-BA84-4183-AAAA-64068703005C}"/>
+              </a:ext>
+            </a:extLst>
+          </p:cNvPr>
+          <p:cNvPicPr>
+            <a:picLocks noChangeAspect="1"/>
+          </p:cNvPicPr>
+          <p:nvPr/>
+        </p:nvPicPr>
+        <p:blipFill>
+          <a:blip r:embed="rId3"/>
+          <a:stretch>
+            <a:fillRect/>
+          </a:stretch>
+        </p:blipFill>
+        <p:spPr>
+          <a:xfrm>
+            <a:off x="8136646" y="2263671"/>
+            <a:ext cx="3953792" cy="2840588"/>
+          </a:xfrm>
+          <a:prstGeom prst="rect">
+            <a:avLst/>
+          </a:prstGeom>
+        </p:spPr>
+      </p:pic>
+    </p:spTree>
+    <p:extLst>
+      <p:ext uri="{BB962C8B-B14F-4D97-AF65-F5344CB8AC3E}">
+        <p14:creationId xmlns:p14="http://schemas.microsoft.com/office/powerpoint/2010/main" val="2501451825"/>
+      </p:ext>
+    </p:extLst>
+  </p:cSld>
+  <p:clrMapOvr>
+    <a:masterClrMapping/>
+  </p:clrMapOvr>
+  <p:transition spd="slow">
+    <p:push dir="u"/>
+  </p:transition>
+</p:sld>
+</file>
+
 <file path=ppt/slides/slide2.xml><?xml version="1.0" encoding="utf-8"?>
 <p:sld xmlns:a="http://schemas.openxmlformats.org/drawingml/2006/main" xmlns:r="http://schemas.openxmlformats.org/officeDocument/2006/relationships" xmlns:p="http://schemas.openxmlformats.org/presentationml/2006/main">
   <p:cSld>
@@ -8495,6 +8723,891 @@
           <a:chExt cx="0" cy="0"/>
         </a:xfrm>
       </p:grpSpPr>
+      <p:sp>
+        <p:nvSpPr>
+          <p:cNvPr id="13" name="Retângulo 12">
+            <a:extLst>
+              <a:ext uri="{FF2B5EF4-FFF2-40B4-BE49-F238E27FC236}">
+                <a16:creationId xmlns:a16="http://schemas.microsoft.com/office/drawing/2014/main" id="{CE636B9A-54ED-41C9-8419-B3A717585316}"/>
+              </a:ext>
+            </a:extLst>
+          </p:cNvPr>
+          <p:cNvSpPr/>
+          <p:nvPr/>
+        </p:nvSpPr>
+        <p:spPr>
+          <a:xfrm>
+            <a:off x="0" y="0"/>
+            <a:ext cx="14630400" cy="8229600"/>
+          </a:xfrm>
+          <a:prstGeom prst="rect">
+            <a:avLst/>
+          </a:prstGeom>
+          <a:solidFill>
+            <a:schemeClr val="bg1"/>
+          </a:solidFill>
+          <a:ln>
+            <a:noFill/>
+          </a:ln>
+        </p:spPr>
+        <p:style>
+          <a:lnRef idx="2">
+            <a:schemeClr val="accent1">
+              <a:shade val="50000"/>
+            </a:schemeClr>
+          </a:lnRef>
+          <a:fillRef idx="1">
+            <a:schemeClr val="accent1"/>
+          </a:fillRef>
+          <a:effectRef idx="0">
+            <a:schemeClr val="accent1"/>
+          </a:effectRef>
+          <a:fontRef idx="minor">
+            <a:schemeClr val="lt1"/>
+          </a:fontRef>
+        </p:style>
+        <p:txBody>
+          <a:bodyPr rtlCol="0" anchor="ctr"/>
+          <a:lstStyle/>
+          <a:p>
+            <a:pPr algn="ctr"/>
+            <a:endParaRPr lang="pt-BR"/>
+          </a:p>
+        </p:txBody>
+      </p:sp>
+      <p:sp>
+        <p:nvSpPr>
+          <p:cNvPr id="16" name="CaixaDeTexto 15">
+            <a:extLst>
+              <a:ext uri="{FF2B5EF4-FFF2-40B4-BE49-F238E27FC236}">
+                <a16:creationId xmlns:a16="http://schemas.microsoft.com/office/drawing/2014/main" id="{06869EFE-4552-4A83-A595-CC0E3D7ADBDD}"/>
+              </a:ext>
+            </a:extLst>
+          </p:cNvPr>
+          <p:cNvSpPr txBox="1"/>
+          <p:nvPr/>
+        </p:nvSpPr>
+        <p:spPr>
+          <a:xfrm>
+            <a:off x="1165661" y="5926776"/>
+            <a:ext cx="2774029" cy="430887"/>
+          </a:xfrm>
+          <a:prstGeom prst="rect">
+            <a:avLst/>
+          </a:prstGeom>
+          <a:noFill/>
+        </p:spPr>
+        <p:txBody>
+          <a:bodyPr wrap="none" rtlCol="0">
+            <a:spAutoFit/>
+          </a:bodyPr>
+          <a:lstStyle/>
+          <a:p>
+            <a:r>
+              <a:rPr lang="pt-BR" sz="2200" b="1" i="0" dirty="0">
+                <a:effectLst/>
+                <a:latin typeface="Segoe UI" panose="020B0502040204020203" pitchFamily="34" charset="0"/>
+                <a:cs typeface="Segoe UI" panose="020B0502040204020203" pitchFamily="34" charset="0"/>
+              </a:rPr>
+              <a:t>Local recomendado</a:t>
+            </a:r>
+            <a:endParaRPr lang="pt-BR" sz="2200" b="1" dirty="0">
+              <a:latin typeface="Segoe UI" panose="020B0502040204020203" pitchFamily="34" charset="0"/>
+              <a:cs typeface="Segoe UI" panose="020B0502040204020203" pitchFamily="34" charset="0"/>
+            </a:endParaRPr>
+          </a:p>
+        </p:txBody>
+      </p:sp>
+      <p:sp>
+        <p:nvSpPr>
+          <p:cNvPr id="15" name="Retângulo 14">
+            <a:extLst>
+              <a:ext uri="{FF2B5EF4-FFF2-40B4-BE49-F238E27FC236}">
+                <a16:creationId xmlns:a16="http://schemas.microsoft.com/office/drawing/2014/main" id="{0439D6C4-63B8-45D6-9907-951303B17DA3}"/>
+              </a:ext>
+            </a:extLst>
+          </p:cNvPr>
+          <p:cNvSpPr/>
+          <p:nvPr/>
+        </p:nvSpPr>
+        <p:spPr>
+          <a:xfrm>
+            <a:off x="964168" y="4329660"/>
+            <a:ext cx="3236976" cy="2672862"/>
+          </a:xfrm>
+          <a:prstGeom prst="rect">
+            <a:avLst/>
+          </a:prstGeom>
+          <a:solidFill>
+            <a:schemeClr val="bg1"/>
+          </a:solidFill>
+          <a:ln>
+            <a:noFill/>
+          </a:ln>
+        </p:spPr>
+        <p:style>
+          <a:lnRef idx="2">
+            <a:schemeClr val="accent1">
+              <a:shade val="50000"/>
+            </a:schemeClr>
+          </a:lnRef>
+          <a:fillRef idx="1">
+            <a:schemeClr val="accent1"/>
+          </a:fillRef>
+          <a:effectRef idx="0">
+            <a:schemeClr val="accent1"/>
+          </a:effectRef>
+          <a:fontRef idx="minor">
+            <a:schemeClr val="lt1"/>
+          </a:fontRef>
+        </p:style>
+        <p:txBody>
+          <a:bodyPr rtlCol="0" anchor="ctr"/>
+          <a:lstStyle/>
+          <a:p>
+            <a:pPr algn="ctr"/>
+            <a:endParaRPr lang="pt-BR" dirty="0"/>
+          </a:p>
+        </p:txBody>
+      </p:sp>
+      <p:sp>
+        <p:nvSpPr>
+          <p:cNvPr id="17" name="CaixaDeTexto 16">
+            <a:extLst>
+              <a:ext uri="{FF2B5EF4-FFF2-40B4-BE49-F238E27FC236}">
+                <a16:creationId xmlns:a16="http://schemas.microsoft.com/office/drawing/2014/main" id="{4F23ABF7-DA2F-475A-8E3E-25F2EDC76A61}"/>
+              </a:ext>
+            </a:extLst>
+          </p:cNvPr>
+          <p:cNvSpPr txBox="1"/>
+          <p:nvPr/>
+        </p:nvSpPr>
+        <p:spPr>
+          <a:xfrm>
+            <a:off x="5227892" y="5904956"/>
+            <a:ext cx="3844835" cy="430887"/>
+          </a:xfrm>
+          <a:prstGeom prst="rect">
+            <a:avLst/>
+          </a:prstGeom>
+          <a:noFill/>
+        </p:spPr>
+        <p:txBody>
+          <a:bodyPr wrap="none" rtlCol="0">
+            <a:spAutoFit/>
+          </a:bodyPr>
+          <a:lstStyle/>
+          <a:p>
+            <a:r>
+              <a:rPr lang="pt-BR" sz="2200" b="1" dirty="0">
+                <a:latin typeface="Segoe UI" panose="020B0502040204020203" pitchFamily="34" charset="0"/>
+                <a:cs typeface="Segoe UI" panose="020B0502040204020203" pitchFamily="34" charset="0"/>
+              </a:rPr>
+              <a:t>Implementação de sensores</a:t>
+            </a:r>
+          </a:p>
+        </p:txBody>
+      </p:sp>
+      <p:sp>
+        <p:nvSpPr>
+          <p:cNvPr id="18" name="Retângulo 17">
+            <a:extLst>
+              <a:ext uri="{FF2B5EF4-FFF2-40B4-BE49-F238E27FC236}">
+                <a16:creationId xmlns:a16="http://schemas.microsoft.com/office/drawing/2014/main" id="{860BEECA-6114-47AB-8D17-8C1492A08C3E}"/>
+              </a:ext>
+            </a:extLst>
+          </p:cNvPr>
+          <p:cNvSpPr/>
+          <p:nvPr/>
+        </p:nvSpPr>
+        <p:spPr>
+          <a:xfrm>
+            <a:off x="5164767" y="4177260"/>
+            <a:ext cx="3907960" cy="2672862"/>
+          </a:xfrm>
+          <a:prstGeom prst="rect">
+            <a:avLst/>
+          </a:prstGeom>
+          <a:solidFill>
+            <a:schemeClr val="bg1"/>
+          </a:solidFill>
+          <a:ln>
+            <a:noFill/>
+          </a:ln>
+        </p:spPr>
+        <p:style>
+          <a:lnRef idx="2">
+            <a:schemeClr val="accent1">
+              <a:shade val="50000"/>
+            </a:schemeClr>
+          </a:lnRef>
+          <a:fillRef idx="1">
+            <a:schemeClr val="accent1"/>
+          </a:fillRef>
+          <a:effectRef idx="0">
+            <a:schemeClr val="accent1"/>
+          </a:effectRef>
+          <a:fontRef idx="minor">
+            <a:schemeClr val="lt1"/>
+          </a:fontRef>
+        </p:style>
+        <p:txBody>
+          <a:bodyPr rtlCol="0" anchor="ctr"/>
+          <a:lstStyle/>
+          <a:p>
+            <a:pPr algn="ctr"/>
+            <a:endParaRPr lang="pt-BR" dirty="0"/>
+          </a:p>
+        </p:txBody>
+      </p:sp>
+      <p:sp>
+        <p:nvSpPr>
+          <p:cNvPr id="19" name="CaixaDeTexto 18">
+            <a:extLst>
+              <a:ext uri="{FF2B5EF4-FFF2-40B4-BE49-F238E27FC236}">
+                <a16:creationId xmlns:a16="http://schemas.microsoft.com/office/drawing/2014/main" id="{77C148EB-4691-4F74-A857-4B101ADD1D47}"/>
+              </a:ext>
+            </a:extLst>
+          </p:cNvPr>
+          <p:cNvSpPr txBox="1"/>
+          <p:nvPr/>
+        </p:nvSpPr>
+        <p:spPr>
+          <a:xfrm>
+            <a:off x="9829744" y="5892466"/>
+            <a:ext cx="3428567" cy="430887"/>
+          </a:xfrm>
+          <a:prstGeom prst="rect">
+            <a:avLst/>
+          </a:prstGeom>
+          <a:noFill/>
+        </p:spPr>
+        <p:txBody>
+          <a:bodyPr wrap="none" rtlCol="0">
+            <a:spAutoFit/>
+          </a:bodyPr>
+          <a:lstStyle/>
+          <a:p>
+            <a:r>
+              <a:rPr lang="pt-BR" sz="2200" b="1" dirty="0">
+                <a:latin typeface="Segoe UI" panose="020B0502040204020203" pitchFamily="34" charset="0"/>
+                <a:cs typeface="Segoe UI" panose="020B0502040204020203" pitchFamily="34" charset="0"/>
+              </a:rPr>
+              <a:t>Praticantes de exercícios</a:t>
+            </a:r>
+          </a:p>
+        </p:txBody>
+      </p:sp>
+      <p:sp>
+        <p:nvSpPr>
+          <p:cNvPr id="20" name="Retângulo 19">
+            <a:extLst>
+              <a:ext uri="{FF2B5EF4-FFF2-40B4-BE49-F238E27FC236}">
+                <a16:creationId xmlns:a16="http://schemas.microsoft.com/office/drawing/2014/main" id="{E0CD65CD-EE16-45EE-A61A-5D5435CE4832}"/>
+              </a:ext>
+            </a:extLst>
+          </p:cNvPr>
+          <p:cNvSpPr/>
+          <p:nvPr/>
+        </p:nvSpPr>
+        <p:spPr>
+          <a:xfrm>
+            <a:off x="9661689" y="4329660"/>
+            <a:ext cx="3788039" cy="2672862"/>
+          </a:xfrm>
+          <a:prstGeom prst="rect">
+            <a:avLst/>
+          </a:prstGeom>
+          <a:solidFill>
+            <a:schemeClr val="bg1"/>
+          </a:solidFill>
+          <a:ln>
+            <a:noFill/>
+          </a:ln>
+        </p:spPr>
+        <p:style>
+          <a:lnRef idx="2">
+            <a:schemeClr val="accent1">
+              <a:shade val="50000"/>
+            </a:schemeClr>
+          </a:lnRef>
+          <a:fillRef idx="1">
+            <a:schemeClr val="accent1"/>
+          </a:fillRef>
+          <a:effectRef idx="0">
+            <a:schemeClr val="accent1"/>
+          </a:effectRef>
+          <a:fontRef idx="minor">
+            <a:schemeClr val="lt1"/>
+          </a:fontRef>
+        </p:style>
+        <p:txBody>
+          <a:bodyPr rtlCol="0" anchor="ctr"/>
+          <a:lstStyle/>
+          <a:p>
+            <a:pPr algn="ctr"/>
+            <a:endParaRPr lang="pt-BR" dirty="0"/>
+          </a:p>
+        </p:txBody>
+      </p:sp>
+      <p:sp>
+        <p:nvSpPr>
+          <p:cNvPr id="14" name="Forma Livre: Forma 13">
+            <a:extLst>
+              <a:ext uri="{FF2B5EF4-FFF2-40B4-BE49-F238E27FC236}">
+                <a16:creationId xmlns:a16="http://schemas.microsoft.com/office/drawing/2014/main" id="{01687894-A066-473B-B546-9A9CFB5FD2B5}"/>
+              </a:ext>
+            </a:extLst>
+          </p:cNvPr>
+          <p:cNvSpPr/>
+          <p:nvPr/>
+        </p:nvSpPr>
+        <p:spPr>
+          <a:xfrm>
+            <a:off x="0" y="0"/>
+            <a:ext cx="14630400" cy="4413742"/>
+          </a:xfrm>
+          <a:custGeom>
+            <a:avLst/>
+            <a:gdLst>
+              <a:gd name="connsiteX0" fmla="*/ 0 w 14630400"/>
+              <a:gd name="connsiteY0" fmla="*/ 0 h 4114800"/>
+              <a:gd name="connsiteX1" fmla="*/ 14630400 w 14630400"/>
+              <a:gd name="connsiteY1" fmla="*/ 0 h 4114800"/>
+              <a:gd name="connsiteX2" fmla="*/ 14630400 w 14630400"/>
+              <a:gd name="connsiteY2" fmla="*/ 4114800 h 4114800"/>
+              <a:gd name="connsiteX3" fmla="*/ 0 w 14630400"/>
+              <a:gd name="connsiteY3" fmla="*/ 4114800 h 4114800"/>
+              <a:gd name="connsiteX0" fmla="*/ 0 w 14630400"/>
+              <a:gd name="connsiteY0" fmla="*/ 0 h 4114800"/>
+              <a:gd name="connsiteX1" fmla="*/ 14630400 w 14630400"/>
+              <a:gd name="connsiteY1" fmla="*/ 0 h 4114800"/>
+              <a:gd name="connsiteX2" fmla="*/ 14630400 w 14630400"/>
+              <a:gd name="connsiteY2" fmla="*/ 4114800 h 4114800"/>
+              <a:gd name="connsiteX3" fmla="*/ 0 w 14630400"/>
+              <a:gd name="connsiteY3" fmla="*/ 4114800 h 4114800"/>
+              <a:gd name="connsiteX4" fmla="*/ 0 w 14630400"/>
+              <a:gd name="connsiteY4" fmla="*/ 0 h 4114800"/>
+              <a:gd name="connsiteX0" fmla="*/ 0 w 14630400"/>
+              <a:gd name="connsiteY0" fmla="*/ 0 h 4114800"/>
+              <a:gd name="connsiteX1" fmla="*/ 14630400 w 14630400"/>
+              <a:gd name="connsiteY1" fmla="*/ 0 h 4114800"/>
+              <a:gd name="connsiteX2" fmla="*/ 14630400 w 14630400"/>
+              <a:gd name="connsiteY2" fmla="*/ 4114800 h 4114800"/>
+              <a:gd name="connsiteX3" fmla="*/ 0 w 14630400"/>
+              <a:gd name="connsiteY3" fmla="*/ 4114800 h 4114800"/>
+              <a:gd name="connsiteX4" fmla="*/ 0 w 14630400"/>
+              <a:gd name="connsiteY4" fmla="*/ 0 h 4114800"/>
+              <a:gd name="connsiteX0" fmla="*/ 0 w 14630400"/>
+              <a:gd name="connsiteY0" fmla="*/ 0 h 4413742"/>
+              <a:gd name="connsiteX1" fmla="*/ 14630400 w 14630400"/>
+              <a:gd name="connsiteY1" fmla="*/ 0 h 4413742"/>
+              <a:gd name="connsiteX2" fmla="*/ 14630400 w 14630400"/>
+              <a:gd name="connsiteY2" fmla="*/ 4114800 h 4413742"/>
+              <a:gd name="connsiteX3" fmla="*/ 0 w 14630400"/>
+              <a:gd name="connsiteY3" fmla="*/ 4114800 h 4413742"/>
+              <a:gd name="connsiteX4" fmla="*/ 0 w 14630400"/>
+              <a:gd name="connsiteY4" fmla="*/ 0 h 4413742"/>
+            </a:gdLst>
+            <a:ahLst/>
+            <a:cxnLst>
+              <a:cxn ang="0">
+                <a:pos x="connsiteX0" y="connsiteY0"/>
+              </a:cxn>
+              <a:cxn ang="0">
+                <a:pos x="connsiteX1" y="connsiteY1"/>
+              </a:cxn>
+              <a:cxn ang="0">
+                <a:pos x="connsiteX2" y="connsiteY2"/>
+              </a:cxn>
+              <a:cxn ang="0">
+                <a:pos x="connsiteX3" y="connsiteY3"/>
+              </a:cxn>
+              <a:cxn ang="0">
+                <a:pos x="connsiteX4" y="connsiteY4"/>
+              </a:cxn>
+            </a:cxnLst>
+            <a:rect l="l" t="t" r="r" b="b"/>
+            <a:pathLst>
+              <a:path w="14630400" h="4413742">
+                <a:moveTo>
+                  <a:pt x="0" y="0"/>
+                </a:moveTo>
+                <a:lnTo>
+                  <a:pt x="14630400" y="0"/>
+                </a:lnTo>
+                <a:lnTo>
+                  <a:pt x="14630400" y="4114800"/>
+                </a:lnTo>
+                <a:cubicBezTo>
+                  <a:pt x="9678649" y="5373974"/>
+                  <a:pt x="4951750" y="2121108"/>
+                  <a:pt x="0" y="4114800"/>
+                </a:cubicBezTo>
+                <a:lnTo>
+                  <a:pt x="0" y="0"/>
+                </a:lnTo>
+                <a:close/>
+              </a:path>
+            </a:pathLst>
+          </a:custGeom>
+          <a:gradFill flip="none" rotWithShape="1">
+            <a:gsLst>
+              <a:gs pos="0">
+                <a:srgbClr val="00F5A0"/>
+              </a:gs>
+              <a:gs pos="100000">
+                <a:srgbClr val="00D9F5"/>
+              </a:gs>
+            </a:gsLst>
+            <a:path path="circle">
+              <a:fillToRect l="100000" b="100000"/>
+            </a:path>
+            <a:tileRect t="-100000" r="-100000"/>
+          </a:gradFill>
+          <a:ln>
+            <a:noFill/>
+          </a:ln>
+        </p:spPr>
+        <p:style>
+          <a:lnRef idx="2">
+            <a:schemeClr val="accent1">
+              <a:shade val="50000"/>
+            </a:schemeClr>
+          </a:lnRef>
+          <a:fillRef idx="1">
+            <a:schemeClr val="accent1"/>
+          </a:fillRef>
+          <a:effectRef idx="0">
+            <a:schemeClr val="accent1"/>
+          </a:effectRef>
+          <a:fontRef idx="minor">
+            <a:schemeClr val="lt1"/>
+          </a:fontRef>
+        </p:style>
+        <p:txBody>
+          <a:bodyPr wrap="square" rtlCol="0" anchor="ctr">
+            <a:noAutofit/>
+          </a:bodyPr>
+          <a:lstStyle/>
+          <a:p>
+            <a:pPr algn="ctr"/>
+            <a:endParaRPr lang="pt-BR"/>
+          </a:p>
+        </p:txBody>
+      </p:sp>
+      <p:pic>
+        <p:nvPicPr>
+          <p:cNvPr id="3" name="Gráfico 2">
+            <a:extLst>
+              <a:ext uri="{FF2B5EF4-FFF2-40B4-BE49-F238E27FC236}">
+                <a16:creationId xmlns:a16="http://schemas.microsoft.com/office/drawing/2014/main" id="{1A6F080D-E365-4216-B53A-65A6A647285D}"/>
+              </a:ext>
+            </a:extLst>
+          </p:cNvPr>
+          <p:cNvPicPr>
+            <a:picLocks noChangeAspect="1"/>
+          </p:cNvPicPr>
+          <p:nvPr/>
+        </p:nvPicPr>
+        <p:blipFill>
+          <a:blip r:embed="rId2">
+            <a:extLst>
+              <a:ext uri="{96DAC541-7B7A-43D3-8B79-37D633B846F1}">
+                <asvg:svgBlip xmlns:asvg="http://schemas.microsoft.com/office/drawing/2016/SVG/main" r:embed="rId3"/>
+              </a:ext>
+            </a:extLst>
+          </a:blip>
+          <a:stretch>
+            <a:fillRect/>
+          </a:stretch>
+        </p:blipFill>
+        <p:spPr>
+          <a:xfrm>
+            <a:off x="1605244" y="5117909"/>
+            <a:ext cx="1980000" cy="1980000"/>
+          </a:xfrm>
+          <a:prstGeom prst="rect">
+            <a:avLst/>
+          </a:prstGeom>
+        </p:spPr>
+      </p:pic>
+      <p:pic>
+        <p:nvPicPr>
+          <p:cNvPr id="7" name="Gráfico 6">
+            <a:extLst>
+              <a:ext uri="{FF2B5EF4-FFF2-40B4-BE49-F238E27FC236}">
+                <a16:creationId xmlns:a16="http://schemas.microsoft.com/office/drawing/2014/main" id="{5A043F25-FB0E-402E-9DC6-828584DDB45E}"/>
+              </a:ext>
+            </a:extLst>
+          </p:cNvPr>
+          <p:cNvPicPr>
+            <a:picLocks noChangeAspect="1"/>
+          </p:cNvPicPr>
+          <p:nvPr/>
+        </p:nvPicPr>
+        <p:blipFill>
+          <a:blip r:embed="rId4">
+            <a:extLst>
+              <a:ext uri="{96DAC541-7B7A-43D3-8B79-37D633B846F1}">
+                <asvg:svgBlip xmlns:asvg="http://schemas.microsoft.com/office/drawing/2016/SVG/main" r:embed="rId5"/>
+              </a:ext>
+            </a:extLst>
+          </a:blip>
+          <a:stretch>
+            <a:fillRect/>
+          </a:stretch>
+        </p:blipFill>
+        <p:spPr>
+          <a:xfrm>
+            <a:off x="6173775" y="5022522"/>
+            <a:ext cx="1980000" cy="1980000"/>
+          </a:xfrm>
+          <a:prstGeom prst="rect">
+            <a:avLst/>
+          </a:prstGeom>
+        </p:spPr>
+      </p:pic>
+      <p:pic>
+        <p:nvPicPr>
+          <p:cNvPr id="11" name="Gráfico 10">
+            <a:extLst>
+              <a:ext uri="{FF2B5EF4-FFF2-40B4-BE49-F238E27FC236}">
+                <a16:creationId xmlns:a16="http://schemas.microsoft.com/office/drawing/2014/main" id="{61BE0708-78C5-4539-A9ED-932A081EE247}"/>
+              </a:ext>
+            </a:extLst>
+          </p:cNvPr>
+          <p:cNvPicPr>
+            <a:picLocks noChangeAspect="1"/>
+          </p:cNvPicPr>
+          <p:nvPr/>
+        </p:nvPicPr>
+        <p:blipFill>
+          <a:blip r:embed="rId6">
+            <a:extLst>
+              <a:ext uri="{96DAC541-7B7A-43D3-8B79-37D633B846F1}">
+                <asvg:svgBlip xmlns:asvg="http://schemas.microsoft.com/office/drawing/2016/SVG/main" r:embed="rId7"/>
+              </a:ext>
+            </a:extLst>
+          </a:blip>
+          <a:stretch>
+            <a:fillRect/>
+          </a:stretch>
+        </p:blipFill>
+        <p:spPr>
+          <a:xfrm>
+            <a:off x="10554027" y="4936776"/>
+            <a:ext cx="1980000" cy="1980000"/>
+          </a:xfrm>
+          <a:prstGeom prst="rect">
+            <a:avLst/>
+          </a:prstGeom>
+        </p:spPr>
+      </p:pic>
+      <p:sp>
+        <p:nvSpPr>
+          <p:cNvPr id="21" name="CaixaDeTexto 20">
+            <a:extLst>
+              <a:ext uri="{FF2B5EF4-FFF2-40B4-BE49-F238E27FC236}">
+                <a16:creationId xmlns:a16="http://schemas.microsoft.com/office/drawing/2014/main" id="{3FF3EE0B-7888-42E4-96AE-BA8BC6C1DFCA}"/>
+              </a:ext>
+            </a:extLst>
+          </p:cNvPr>
+          <p:cNvSpPr txBox="1"/>
+          <p:nvPr/>
+        </p:nvSpPr>
+        <p:spPr>
+          <a:xfrm>
+            <a:off x="3125623" y="103472"/>
+            <a:ext cx="8379153" cy="769441"/>
+          </a:xfrm>
+          <a:prstGeom prst="rect">
+            <a:avLst/>
+          </a:prstGeom>
+          <a:noFill/>
+        </p:spPr>
+        <p:txBody>
+          <a:bodyPr wrap="none" rtlCol="0">
+            <a:spAutoFit/>
+          </a:bodyPr>
+          <a:lstStyle/>
+          <a:p>
+            <a:r>
+              <a:rPr lang="pt-BR" sz="4400" b="1" dirty="0">
+                <a:solidFill>
+                  <a:schemeClr val="bg1"/>
+                </a:solidFill>
+                <a:latin typeface="Segoe UI" panose="020B0502040204020203" pitchFamily="34" charset="0"/>
+                <a:cs typeface="Segoe UI" panose="020B0502040204020203" pitchFamily="34" charset="0"/>
+              </a:rPr>
+              <a:t>Melhorias na Governança de TI</a:t>
+            </a:r>
+          </a:p>
+        </p:txBody>
+      </p:sp>
+    </p:spTree>
+    <p:extLst>
+      <p:ext uri="{BB962C8B-B14F-4D97-AF65-F5344CB8AC3E}">
+        <p14:creationId xmlns:p14="http://schemas.microsoft.com/office/powerpoint/2010/main" val="3623346710"/>
+      </p:ext>
+    </p:extLst>
+  </p:cSld>
+  <p:clrMapOvr>
+    <a:overrideClrMapping bg1="lt1" tx1="dk1" bg2="lt2" tx2="dk2" accent1="accent1" accent2="accent2" accent3="accent3" accent4="accent4" accent5="accent5" accent6="accent6" hlink="hlink" folHlink="folHlink"/>
+  </p:clrMapOvr>
+  <mc:AlternateContent xmlns:mc="http://schemas.openxmlformats.org/markup-compatibility/2006">
+    <mc:Choice xmlns:p159="http://schemas.microsoft.com/office/powerpoint/2015/09/main" Requires="p159">
+      <p:transition spd="slow">
+        <p159:morph option="byObject"/>
+      </p:transition>
+    </mc:Choice>
+    <mc:Fallback>
+      <p:transition spd="slow">
+        <p:fade/>
+      </p:transition>
+    </mc:Fallback>
+  </mc:AlternateContent>
+  <p:timing>
+    <p:tnLst>
+      <p:par>
+        <p:cTn id="1" dur="indefinite" restart="never" nodeType="tmRoot">
+          <p:childTnLst>
+            <p:seq concurrent="1" nextAc="seek">
+              <p:cTn id="2" dur="indefinite" nodeType="mainSeq">
+                <p:childTnLst>
+                  <p:par>
+                    <p:cTn id="3" fill="hold">
+                      <p:stCondLst>
+                        <p:cond delay="indefinite"/>
+                      </p:stCondLst>
+                      <p:childTnLst>
+                        <p:par>
+                          <p:cTn id="4" fill="hold">
+                            <p:stCondLst>
+                              <p:cond delay="0"/>
+                            </p:stCondLst>
+                            <p:childTnLst>
+                              <p:par>
+                                <p:cTn id="5" presetID="64" presetClass="path" presetSubtype="0" accel="50000" decel="50000" fill="hold" nodeType="clickEffect">
+                                  <p:stCondLst>
+                                    <p:cond delay="0"/>
+                                  </p:stCondLst>
+                                  <p:childTnLst>
+                                    <p:animMotion origin="layout" path="M -3.47222E-7 -1.04938E-6 L -3.47222E-7 -0.46219 " pathEditMode="relative" rAng="0" ptsTypes="AA">
+                                      <p:cBhvr>
+                                        <p:cTn id="6" dur="1000" fill="hold"/>
+                                        <p:tgtEl>
+                                          <p:spTgt spid="3"/>
+                                        </p:tgtEl>
+                                        <p:attrNameLst>
+                                          <p:attrName>ppt_x</p:attrName>
+                                          <p:attrName>ppt_y</p:attrName>
+                                        </p:attrNameLst>
+                                      </p:cBhvr>
+                                      <p:rCtr x="0" y="-23110"/>
+                                    </p:animMotion>
+                                  </p:childTnLst>
+                                </p:cTn>
+                              </p:par>
+                              <p:par>
+                                <p:cTn id="7" presetID="64" presetClass="path" presetSubtype="0" decel="100000" fill="hold" grpId="0" nodeType="withEffect">
+                                  <p:stCondLst>
+                                    <p:cond delay="0"/>
+                                  </p:stCondLst>
+                                  <p:childTnLst>
+                                    <p:animMotion origin="layout" path="M -2.29167E-6 -4.50617E-6 L -2.29167E-6 -0.5 " pathEditMode="relative" rAng="0" ptsTypes="AA">
+                                      <p:cBhvr>
+                                        <p:cTn id="8" dur="1000" fill="hold"/>
+                                        <p:tgtEl>
+                                          <p:spTgt spid="15"/>
+                                        </p:tgtEl>
+                                        <p:attrNameLst>
+                                          <p:attrName>ppt_x</p:attrName>
+                                          <p:attrName>ppt_y</p:attrName>
+                                        </p:attrNameLst>
+                                      </p:cBhvr>
+                                      <p:rCtr x="0" y="-25000"/>
+                                    </p:animMotion>
+                                  </p:childTnLst>
+                                </p:cTn>
+                              </p:par>
+                            </p:childTnLst>
+                          </p:cTn>
+                        </p:par>
+                      </p:childTnLst>
+                    </p:cTn>
+                  </p:par>
+                  <p:par>
+                    <p:cTn id="9" fill="hold">
+                      <p:stCondLst>
+                        <p:cond delay="indefinite"/>
+                      </p:stCondLst>
+                      <p:childTnLst>
+                        <p:par>
+                          <p:cTn id="10" fill="hold">
+                            <p:stCondLst>
+                              <p:cond delay="0"/>
+                            </p:stCondLst>
+                            <p:childTnLst>
+                              <p:par>
+                                <p:cTn id="11" presetID="64" presetClass="path" presetSubtype="0" accel="50000" decel="50000" fill="hold" nodeType="clickEffect">
+                                  <p:stCondLst>
+                                    <p:cond delay="0"/>
+                                  </p:stCondLst>
+                                  <p:childTnLst>
+                                    <p:animMotion origin="layout" path="M -3.33333E-6 3.02469E-6 L -3.33333E-6 -0.44811 " pathEditMode="relative" rAng="0" ptsTypes="AA">
+                                      <p:cBhvr>
+                                        <p:cTn id="12" dur="1000" fill="hold"/>
+                                        <p:tgtEl>
+                                          <p:spTgt spid="7"/>
+                                        </p:tgtEl>
+                                        <p:attrNameLst>
+                                          <p:attrName>ppt_x</p:attrName>
+                                          <p:attrName>ppt_y</p:attrName>
+                                        </p:attrNameLst>
+                                      </p:cBhvr>
+                                      <p:rCtr x="0" y="-22415"/>
+                                    </p:animMotion>
+                                  </p:childTnLst>
+                                </p:cTn>
+                              </p:par>
+                              <p:par>
+                                <p:cTn id="13" presetID="64" presetClass="path" presetSubtype="0" decel="100000" fill="hold" grpId="0" nodeType="withEffect">
+                                  <p:stCondLst>
+                                    <p:cond delay="0"/>
+                                  </p:stCondLst>
+                                  <p:childTnLst>
+                                    <p:animMotion origin="layout" path="M 4.86111E-6 4.01235E-6 L 4.86111E-6 -0.5 " pathEditMode="relative" rAng="0" ptsTypes="AA">
+                                      <p:cBhvr>
+                                        <p:cTn id="14" dur="1000" fill="hold"/>
+                                        <p:tgtEl>
+                                          <p:spTgt spid="18"/>
+                                        </p:tgtEl>
+                                        <p:attrNameLst>
+                                          <p:attrName>ppt_x</p:attrName>
+                                          <p:attrName>ppt_y</p:attrName>
+                                        </p:attrNameLst>
+                                      </p:cBhvr>
+                                      <p:rCtr x="0" y="-25000"/>
+                                    </p:animMotion>
+                                  </p:childTnLst>
+                                </p:cTn>
+                              </p:par>
+                            </p:childTnLst>
+                          </p:cTn>
+                        </p:par>
+                      </p:childTnLst>
+                    </p:cTn>
+                  </p:par>
+                  <p:par>
+                    <p:cTn id="15" fill="hold">
+                      <p:stCondLst>
+                        <p:cond delay="indefinite"/>
+                      </p:stCondLst>
+                      <p:childTnLst>
+                        <p:par>
+                          <p:cTn id="16" fill="hold">
+                            <p:stCondLst>
+                              <p:cond delay="0"/>
+                            </p:stCondLst>
+                            <p:childTnLst>
+                              <p:par>
+                                <p:cTn id="17" presetID="64" presetClass="path" presetSubtype="0" accel="50000" decel="50000" fill="hold" nodeType="clickEffect">
+                                  <p:stCondLst>
+                                    <p:cond delay="0"/>
+                                  </p:stCondLst>
+                                  <p:childTnLst>
+                                    <p:animMotion origin="layout" path="M -3.99306E-6 -3.08642E-7 L -3.99306E-6 -0.43615 " pathEditMode="relative" rAng="0" ptsTypes="AA">
+                                      <p:cBhvr>
+                                        <p:cTn id="18" dur="1000" fill="hold"/>
+                                        <p:tgtEl>
+                                          <p:spTgt spid="11"/>
+                                        </p:tgtEl>
+                                        <p:attrNameLst>
+                                          <p:attrName>ppt_x</p:attrName>
+                                          <p:attrName>ppt_y</p:attrName>
+                                        </p:attrNameLst>
+                                      </p:cBhvr>
+                                      <p:rCtr x="0" y="-21817"/>
+                                    </p:animMotion>
+                                  </p:childTnLst>
+                                </p:cTn>
+                              </p:par>
+                              <p:par>
+                                <p:cTn id="19" presetID="64" presetClass="path" presetSubtype="0" decel="100000" fill="hold" grpId="0" nodeType="withEffect">
+                                  <p:stCondLst>
+                                    <p:cond delay="0"/>
+                                  </p:stCondLst>
+                                  <p:childTnLst>
+                                    <p:animMotion origin="layout" path="M -2.04861E-6 -4.50617E-6 L -2.04861E-6 -0.5 " pathEditMode="relative" rAng="0" ptsTypes="AA">
+                                      <p:cBhvr>
+                                        <p:cTn id="20" dur="1000" fill="hold"/>
+                                        <p:tgtEl>
+                                          <p:spTgt spid="20"/>
+                                        </p:tgtEl>
+                                        <p:attrNameLst>
+                                          <p:attrName>ppt_x</p:attrName>
+                                          <p:attrName>ppt_y</p:attrName>
+                                        </p:attrNameLst>
+                                      </p:cBhvr>
+                                      <p:rCtr x="0" y="-25000"/>
+                                    </p:animMotion>
+                                  </p:childTnLst>
+                                </p:cTn>
+                              </p:par>
+                            </p:childTnLst>
+                          </p:cTn>
+                        </p:par>
+                      </p:childTnLst>
+                    </p:cTn>
+                  </p:par>
+                </p:childTnLst>
+              </p:cTn>
+              <p:prevCondLst>
+                <p:cond evt="onPrev" delay="0">
+                  <p:tgtEl>
+                    <p:sldTgt/>
+                  </p:tgtEl>
+                </p:cond>
+              </p:prevCondLst>
+              <p:nextCondLst>
+                <p:cond evt="onNext" delay="0">
+                  <p:tgtEl>
+                    <p:sldTgt/>
+                  </p:tgtEl>
+                </p:cond>
+              </p:nextCondLst>
+            </p:seq>
+          </p:childTnLst>
+        </p:cTn>
+      </p:par>
+    </p:tnLst>
+    <p:bldLst>
+      <p:bldP spid="15" grpId="0" animBg="1"/>
+      <p:bldP spid="18" grpId="0" animBg="1"/>
+      <p:bldP spid="20" grpId="0" animBg="1"/>
+    </p:bldLst>
+  </p:timing>
+</p:sld>
+</file>
+
+<file path=ppt/slides/slide5.xml><?xml version="1.0" encoding="utf-8"?>
+<p:sld xmlns:a="http://schemas.openxmlformats.org/drawingml/2006/main" xmlns:r="http://schemas.openxmlformats.org/officeDocument/2006/relationships" xmlns:p="http://schemas.openxmlformats.org/presentationml/2006/main">
+  <p:cSld>
+    <p:spTree>
+      <p:nvGrpSpPr>
+        <p:cNvPr id="1" name=""/>
+        <p:cNvGrpSpPr/>
+        <p:nvPr/>
+      </p:nvGrpSpPr>
+      <p:grpSpPr>
+        <a:xfrm>
+          <a:off x="0" y="0"/>
+          <a:ext cx="0" cy="0"/>
+          <a:chOff x="0" y="0"/>
+          <a:chExt cx="0" cy="0"/>
+        </a:xfrm>
+      </p:grpSpPr>
       <p:pic>
         <p:nvPicPr>
           <p:cNvPr id="4" name="Imagem 3">
@@ -8550,7 +9663,7 @@
 </p:sld>
 </file>
 
-<file path=ppt/slides/slide5.xml><?xml version="1.0" encoding="utf-8"?>
+<file path=ppt/slides/slide6.xml><?xml version="1.0" encoding="utf-8"?>
 <p:sld xmlns:a="http://schemas.openxmlformats.org/drawingml/2006/main" xmlns:r="http://schemas.openxmlformats.org/officeDocument/2006/relationships" xmlns:p="http://schemas.openxmlformats.org/presentationml/2006/main">
   <p:cSld>
     <p:spTree>
@@ -8622,7 +9735,7 @@
 </p:sld>
 </file>
 
-<file path=ppt/slides/slide6.xml><?xml version="1.0" encoding="utf-8"?>
+<file path=ppt/slides/slide7.xml><?xml version="1.0" encoding="utf-8"?>
 <p:sld xmlns:a="http://schemas.openxmlformats.org/drawingml/2006/main" xmlns:r="http://schemas.openxmlformats.org/officeDocument/2006/relationships" xmlns:p="http://schemas.openxmlformats.org/presentationml/2006/main">
   <p:cSld>
     <p:spTree>
@@ -8694,7 +9807,314 @@
 </p:sld>
 </file>
 
-<file path=ppt/slides/slide7.xml><?xml version="1.0" encoding="utf-8"?>
+<file path=ppt/slides/slide8.xml><?xml version="1.0" encoding="utf-8"?>
+<p:sld xmlns:a="http://schemas.openxmlformats.org/drawingml/2006/main" xmlns:r="http://schemas.openxmlformats.org/officeDocument/2006/relationships" xmlns:p="http://schemas.openxmlformats.org/presentationml/2006/main">
+  <p:cSld>
+    <p:spTree>
+      <p:nvGrpSpPr>
+        <p:cNvPr id="1" name=""/>
+        <p:cNvGrpSpPr/>
+        <p:nvPr/>
+      </p:nvGrpSpPr>
+      <p:grpSpPr>
+        <a:xfrm>
+          <a:off x="0" y="0"/>
+          <a:ext cx="0" cy="0"/>
+          <a:chOff x="0" y="0"/>
+          <a:chExt cx="0" cy="0"/>
+        </a:xfrm>
+      </p:grpSpPr>
+      <p:sp>
+        <p:nvSpPr>
+          <p:cNvPr id="4" name="Retângulo 3">
+            <a:extLst>
+              <a:ext uri="{FF2B5EF4-FFF2-40B4-BE49-F238E27FC236}">
+                <a16:creationId xmlns:a16="http://schemas.microsoft.com/office/drawing/2014/main" id="{AE06834C-AFDD-4DD6-8045-6CEE36AFB3CE}"/>
+              </a:ext>
+            </a:extLst>
+          </p:cNvPr>
+          <p:cNvSpPr/>
+          <p:nvPr/>
+        </p:nvSpPr>
+        <p:spPr>
+          <a:xfrm>
+            <a:off x="0" y="0"/>
+            <a:ext cx="14630400" cy="8229600"/>
+          </a:xfrm>
+          <a:prstGeom prst="rect">
+            <a:avLst/>
+          </a:prstGeom>
+          <a:solidFill>
+            <a:schemeClr val="bg1"/>
+          </a:solidFill>
+          <a:ln>
+            <a:noFill/>
+          </a:ln>
+        </p:spPr>
+        <p:style>
+          <a:lnRef idx="2">
+            <a:schemeClr val="accent1">
+              <a:shade val="50000"/>
+            </a:schemeClr>
+          </a:lnRef>
+          <a:fillRef idx="1">
+            <a:schemeClr val="accent1"/>
+          </a:fillRef>
+          <a:effectRef idx="0">
+            <a:schemeClr val="accent1"/>
+          </a:effectRef>
+          <a:fontRef idx="minor">
+            <a:schemeClr val="lt1"/>
+          </a:fontRef>
+        </p:style>
+        <p:txBody>
+          <a:bodyPr rtlCol="0" anchor="ctr"/>
+          <a:lstStyle/>
+          <a:p>
+            <a:pPr algn="ctr"/>
+            <a:endParaRPr lang="pt-BR"/>
+          </a:p>
+        </p:txBody>
+      </p:sp>
+      <p:pic>
+        <p:nvPicPr>
+          <p:cNvPr id="6" name="Imagem 5">
+            <a:extLst>
+              <a:ext uri="{FF2B5EF4-FFF2-40B4-BE49-F238E27FC236}">
+                <a16:creationId xmlns:a16="http://schemas.microsoft.com/office/drawing/2014/main" id="{09943668-CF88-49FE-A754-E41F62A90777}"/>
+              </a:ext>
+            </a:extLst>
+          </p:cNvPr>
+          <p:cNvPicPr>
+            <a:picLocks noChangeAspect="1"/>
+          </p:cNvPicPr>
+          <p:nvPr/>
+        </p:nvPicPr>
+        <p:blipFill>
+          <a:blip r:embed="rId2"/>
+          <a:stretch>
+            <a:fillRect/>
+          </a:stretch>
+        </p:blipFill>
+        <p:spPr>
+          <a:xfrm>
+            <a:off x="7810871" y="2970685"/>
+            <a:ext cx="5852160" cy="3291840"/>
+          </a:xfrm>
+          <a:prstGeom prst="roundRect">
+            <a:avLst>
+              <a:gd name="adj" fmla="val 8594"/>
+            </a:avLst>
+          </a:prstGeom>
+          <a:solidFill>
+            <a:srgbClr val="FFFFFF">
+              <a:shade val="85000"/>
+            </a:srgbClr>
+          </a:solidFill>
+          <a:ln>
+            <a:noFill/>
+          </a:ln>
+          <a:effectLst>
+            <a:reflection blurRad="12700" stA="38000" endPos="28000" dist="5000" dir="5400000" sy="-100000" algn="bl" rotWithShape="0"/>
+          </a:effectLst>
+        </p:spPr>
+      </p:pic>
+      <p:pic>
+        <p:nvPicPr>
+          <p:cNvPr id="8" name="Imagem 7">
+            <a:extLst>
+              <a:ext uri="{FF2B5EF4-FFF2-40B4-BE49-F238E27FC236}">
+                <a16:creationId xmlns:a16="http://schemas.microsoft.com/office/drawing/2014/main" id="{99B1F1F9-357B-432C-830D-5B2ACF8EE7B1}"/>
+              </a:ext>
+            </a:extLst>
+          </p:cNvPr>
+          <p:cNvPicPr>
+            <a:picLocks noChangeAspect="1"/>
+          </p:cNvPicPr>
+          <p:nvPr/>
+        </p:nvPicPr>
+        <p:blipFill>
+          <a:blip r:embed="rId3"/>
+          <a:stretch>
+            <a:fillRect/>
+          </a:stretch>
+        </p:blipFill>
+        <p:spPr>
+          <a:xfrm>
+            <a:off x="991343" y="2970685"/>
+            <a:ext cx="5852160" cy="3291840"/>
+          </a:xfrm>
+          <a:prstGeom prst="roundRect">
+            <a:avLst>
+              <a:gd name="adj" fmla="val 8594"/>
+            </a:avLst>
+          </a:prstGeom>
+          <a:solidFill>
+            <a:srgbClr val="FFFFFF">
+              <a:shade val="85000"/>
+            </a:srgbClr>
+          </a:solidFill>
+          <a:ln>
+            <a:noFill/>
+          </a:ln>
+          <a:effectLst>
+            <a:reflection blurRad="12700" stA="38000" endPos="28000" dist="5000" dir="5400000" sy="-100000" algn="bl" rotWithShape="0"/>
+          </a:effectLst>
+        </p:spPr>
+      </p:pic>
+      <p:sp>
+        <p:nvSpPr>
+          <p:cNvPr id="10" name="CaixaDeTexto 9">
+            <a:extLst>
+              <a:ext uri="{FF2B5EF4-FFF2-40B4-BE49-F238E27FC236}">
+                <a16:creationId xmlns:a16="http://schemas.microsoft.com/office/drawing/2014/main" id="{860A3AE5-5D7F-457A-9CA8-3D3DC42540EB}"/>
+              </a:ext>
+            </a:extLst>
+          </p:cNvPr>
+          <p:cNvSpPr txBox="1"/>
+          <p:nvPr/>
+        </p:nvSpPr>
+        <p:spPr>
+          <a:xfrm>
+            <a:off x="-3397777" y="1003610"/>
+            <a:ext cx="14630400" cy="1323439"/>
+          </a:xfrm>
+          <a:prstGeom prst="rect">
+            <a:avLst/>
+          </a:prstGeom>
+          <a:noFill/>
+        </p:spPr>
+        <p:txBody>
+          <a:bodyPr wrap="square" rtlCol="0">
+            <a:spAutoFit/>
+          </a:bodyPr>
+          <a:lstStyle/>
+          <a:p>
+            <a:pPr algn="ctr"/>
+            <a:r>
+              <a:rPr lang="pt-BR" sz="8000" b="1" dirty="0">
+                <a:gradFill>
+                  <a:gsLst>
+                    <a:gs pos="0">
+                      <a:srgbClr val="00F5A0"/>
+                    </a:gs>
+                    <a:gs pos="100000">
+                      <a:srgbClr val="00D9F5"/>
+                    </a:gs>
+                  </a:gsLst>
+                  <a:lin ang="16200000" scaled="1"/>
+                </a:gradFill>
+                <a:effectLst>
+                  <a:outerShdw blurRad="127000" dist="38100" dir="5400000" algn="t" rotWithShape="0">
+                    <a:prstClr val="black">
+                      <a:alpha val="0"/>
+                    </a:prstClr>
+                  </a:outerShdw>
+                </a:effectLst>
+                <a:latin typeface="Segoe UI" panose="020B0502040204020203" pitchFamily="34" charset="0"/>
+                <a:cs typeface="Segoe UI" panose="020B0502040204020203" pitchFamily="34" charset="0"/>
+              </a:rPr>
+              <a:t>ANTES</a:t>
+            </a:r>
+          </a:p>
+        </p:txBody>
+      </p:sp>
+      <p:sp>
+        <p:nvSpPr>
+          <p:cNvPr id="12" name="CaixaDeTexto 11">
+            <a:extLst>
+              <a:ext uri="{FF2B5EF4-FFF2-40B4-BE49-F238E27FC236}">
+                <a16:creationId xmlns:a16="http://schemas.microsoft.com/office/drawing/2014/main" id="{17E48326-D2E6-4C5C-A107-EC7FD730D128}"/>
+              </a:ext>
+            </a:extLst>
+          </p:cNvPr>
+          <p:cNvSpPr txBox="1"/>
+          <p:nvPr/>
+        </p:nvSpPr>
+        <p:spPr>
+          <a:xfrm>
+            <a:off x="3283477" y="1003610"/>
+            <a:ext cx="14630400" cy="1323439"/>
+          </a:xfrm>
+          <a:prstGeom prst="rect">
+            <a:avLst/>
+          </a:prstGeom>
+          <a:noFill/>
+        </p:spPr>
+        <p:txBody>
+          <a:bodyPr wrap="square" rtlCol="0">
+            <a:spAutoFit/>
+          </a:bodyPr>
+          <a:lstStyle/>
+          <a:p>
+            <a:pPr algn="ctr"/>
+            <a:r>
+              <a:rPr lang="en-US" sz="8000" b="1" dirty="0">
+                <a:gradFill>
+                  <a:gsLst>
+                    <a:gs pos="0">
+                      <a:srgbClr val="00F5A0"/>
+                    </a:gs>
+                    <a:gs pos="100000">
+                      <a:srgbClr val="00D9F5"/>
+                    </a:gs>
+                  </a:gsLst>
+                  <a:lin ang="16200000" scaled="1"/>
+                </a:gradFill>
+                <a:effectLst>
+                  <a:outerShdw blurRad="127000" dist="38100" dir="5400000" algn="t" rotWithShape="0">
+                    <a:prstClr val="black">
+                      <a:alpha val="0"/>
+                    </a:prstClr>
+                  </a:outerShdw>
+                </a:effectLst>
+                <a:latin typeface="Segoe UI" panose="020B0502040204020203" pitchFamily="34" charset="0"/>
+                <a:cs typeface="Segoe UI" panose="020B0502040204020203" pitchFamily="34" charset="0"/>
+              </a:rPr>
+              <a:t>D</a:t>
+            </a:r>
+            <a:r>
+              <a:rPr lang="pt-BR" sz="8000" b="1" dirty="0">
+                <a:gradFill>
+                  <a:gsLst>
+                    <a:gs pos="0">
+                      <a:srgbClr val="00F5A0"/>
+                    </a:gs>
+                    <a:gs pos="100000">
+                      <a:srgbClr val="00D9F5"/>
+                    </a:gs>
+                  </a:gsLst>
+                  <a:lin ang="16200000" scaled="1"/>
+                </a:gradFill>
+                <a:effectLst>
+                  <a:outerShdw blurRad="127000" dist="38100" dir="5400000" algn="t" rotWithShape="0">
+                    <a:prstClr val="black">
+                      <a:alpha val="0"/>
+                    </a:prstClr>
+                  </a:outerShdw>
+                </a:effectLst>
+                <a:latin typeface="Segoe UI" panose="020B0502040204020203" pitchFamily="34" charset="0"/>
+                <a:cs typeface="Segoe UI" panose="020B0502040204020203" pitchFamily="34" charset="0"/>
+              </a:rPr>
+              <a:t>EPOIS</a:t>
+            </a:r>
+          </a:p>
+        </p:txBody>
+      </p:sp>
+    </p:spTree>
+    <p:extLst>
+      <p:ext uri="{BB962C8B-B14F-4D97-AF65-F5344CB8AC3E}">
+        <p14:creationId xmlns:p14="http://schemas.microsoft.com/office/powerpoint/2010/main" val="2623634713"/>
+      </p:ext>
+    </p:extLst>
+  </p:cSld>
+  <p:clrMapOvr>
+    <a:masterClrMapping/>
+  </p:clrMapOvr>
+</p:sld>
+</file>
+
+<file path=ppt/slides/slide9.xml><?xml version="1.0" encoding="utf-8"?>
 <p:sld xmlns:a="http://schemas.openxmlformats.org/drawingml/2006/main" xmlns:r="http://schemas.openxmlformats.org/officeDocument/2006/relationships" xmlns:p="http://schemas.openxmlformats.org/presentationml/2006/main">
   <p:cSld>
     <p:spTree>
@@ -8861,232 +10281,6 @@
     <p:extLst>
       <p:ext uri="{BB962C8B-B14F-4D97-AF65-F5344CB8AC3E}">
         <p14:creationId xmlns:p14="http://schemas.microsoft.com/office/powerpoint/2010/main" val="1205419403"/>
-      </p:ext>
-    </p:extLst>
-  </p:cSld>
-  <p:clrMapOvr>
-    <a:masterClrMapping/>
-  </p:clrMapOvr>
-  <p:transition spd="slow">
-    <p:push dir="u"/>
-  </p:transition>
-</p:sld>
-</file>
-
-<file path=ppt/slides/slide8.xml><?xml version="1.0" encoding="utf-8"?>
-<p:sld xmlns:a="http://schemas.openxmlformats.org/drawingml/2006/main" xmlns:r="http://schemas.openxmlformats.org/officeDocument/2006/relationships" xmlns:p="http://schemas.openxmlformats.org/presentationml/2006/main">
-  <p:cSld>
-    <p:spTree>
-      <p:nvGrpSpPr>
-        <p:cNvPr id="1" name=""/>
-        <p:cNvGrpSpPr/>
-        <p:nvPr/>
-      </p:nvGrpSpPr>
-      <p:grpSpPr>
-        <a:xfrm>
-          <a:off x="0" y="0"/>
-          <a:ext cx="0" cy="0"/>
-          <a:chOff x="0" y="0"/>
-          <a:chExt cx="0" cy="0"/>
-        </a:xfrm>
-      </p:grpSpPr>
-      <p:sp>
-        <p:nvSpPr>
-          <p:cNvPr id="3" name="Retângulo: Cantos Arredondados 2">
-            <a:extLst>
-              <a:ext uri="{FF2B5EF4-FFF2-40B4-BE49-F238E27FC236}">
-                <a16:creationId xmlns:a16="http://schemas.microsoft.com/office/drawing/2014/main" id="{9C610460-61EB-432B-B176-8730516AE2A8}"/>
-              </a:ext>
-            </a:extLst>
-          </p:cNvPr>
-          <p:cNvSpPr/>
-          <p:nvPr/>
-        </p:nvSpPr>
-        <p:spPr>
-          <a:xfrm>
-            <a:off x="1446550" y="831953"/>
-            <a:ext cx="11737298" cy="6565692"/>
-          </a:xfrm>
-          <a:prstGeom prst="roundRect">
-            <a:avLst/>
-          </a:prstGeom>
-          <a:solidFill>
-            <a:schemeClr val="bg1"/>
-          </a:solidFill>
-          <a:ln>
-            <a:noFill/>
-          </a:ln>
-          <a:effectLst>
-            <a:innerShdw blurRad="63500">
-              <a:prstClr val="black">
-                <a:alpha val="25000"/>
-              </a:prstClr>
-            </a:innerShdw>
-          </a:effectLst>
-        </p:spPr>
-        <p:style>
-          <a:lnRef idx="2">
-            <a:schemeClr val="accent1">
-              <a:shade val="50000"/>
-            </a:schemeClr>
-          </a:lnRef>
-          <a:fillRef idx="1">
-            <a:schemeClr val="accent1"/>
-          </a:fillRef>
-          <a:effectRef idx="0">
-            <a:schemeClr val="accent1"/>
-          </a:effectRef>
-          <a:fontRef idx="minor">
-            <a:schemeClr val="lt1"/>
-          </a:fontRef>
-        </p:style>
-        <p:txBody>
-          <a:bodyPr rtlCol="0" anchor="ctr"/>
-          <a:lstStyle/>
-          <a:p>
-            <a:pPr algn="ctr"/>
-            <a:endParaRPr lang="pt-BR"/>
-          </a:p>
-        </p:txBody>
-      </p:sp>
-      <p:sp>
-        <p:nvSpPr>
-          <p:cNvPr id="10" name="CaixaDeTexto 9">
-            <a:extLst>
-              <a:ext uri="{FF2B5EF4-FFF2-40B4-BE49-F238E27FC236}">
-                <a16:creationId xmlns:a16="http://schemas.microsoft.com/office/drawing/2014/main" id="{9A5A89AA-6F45-4CF6-8028-690E52DBD958}"/>
-              </a:ext>
-            </a:extLst>
-          </p:cNvPr>
-          <p:cNvSpPr txBox="1"/>
-          <p:nvPr/>
-        </p:nvSpPr>
-        <p:spPr>
-          <a:xfrm>
-            <a:off x="0" y="5882311"/>
-            <a:ext cx="14630400" cy="1938992"/>
-          </a:xfrm>
-          <a:prstGeom prst="rect">
-            <a:avLst/>
-          </a:prstGeom>
-          <a:noFill/>
-        </p:spPr>
-        <p:txBody>
-          <a:bodyPr wrap="square" rtlCol="0">
-            <a:spAutoFit/>
-          </a:bodyPr>
-          <a:lstStyle/>
-          <a:p>
-            <a:pPr algn="ctr"/>
-            <a:r>
-              <a:rPr lang="pt-BR" sz="12000" b="1" dirty="0">
-                <a:gradFill>
-                  <a:gsLst>
-                    <a:gs pos="0">
-                      <a:srgbClr val="00F5A0"/>
-                    </a:gs>
-                    <a:gs pos="100000">
-                      <a:srgbClr val="00D9F5"/>
-                    </a:gs>
-                  </a:gsLst>
-                  <a:lin ang="16200000" scaled="1"/>
-                </a:gradFill>
-                <a:effectLst>
-                  <a:outerShdw blurRad="127000" dist="38100" dir="5400000" algn="t" rotWithShape="0">
-                    <a:prstClr val="black">
-                      <a:alpha val="0"/>
-                    </a:prstClr>
-                  </a:outerShdw>
-                </a:effectLst>
-                <a:latin typeface="Segoe UI" panose="020B0502040204020203" pitchFamily="34" charset="0"/>
-                <a:cs typeface="Segoe UI" panose="020B0502040204020203" pitchFamily="34" charset="0"/>
-              </a:rPr>
-              <a:t>API’S</a:t>
-            </a:r>
-          </a:p>
-        </p:txBody>
-      </p:sp>
-      <p:pic>
-        <p:nvPicPr>
-          <p:cNvPr id="1026" name="Picture 2" descr="Slack Review | PCMag">
-            <a:extLst>
-              <a:ext uri="{FF2B5EF4-FFF2-40B4-BE49-F238E27FC236}">
-                <a16:creationId xmlns:a16="http://schemas.microsoft.com/office/drawing/2014/main" id="{4824B348-E53B-4C3E-BA83-EA4767AA7B1A}"/>
-              </a:ext>
-            </a:extLst>
-          </p:cNvPr>
-          <p:cNvPicPr>
-            <a:picLocks noChangeAspect="1" noChangeArrowheads="1"/>
-          </p:cNvPicPr>
-          <p:nvPr/>
-        </p:nvPicPr>
-        <p:blipFill>
-          <a:blip r:embed="rId2">
-            <a:extLst>
-              <a:ext uri="{28A0092B-C50C-407E-A947-70E740481C1C}">
-                <a14:useLocalDpi xmlns:a14="http://schemas.microsoft.com/office/drawing/2010/main" val="0"/>
-              </a:ext>
-            </a:extLst>
-          </a:blip>
-          <a:srcRect/>
-          <a:stretch>
-            <a:fillRect/>
-          </a:stretch>
-        </p:blipFill>
-        <p:spPr bwMode="auto">
-          <a:xfrm>
-            <a:off x="2267996" y="2263671"/>
-            <a:ext cx="5047204" cy="2840588"/>
-          </a:xfrm>
-          <a:prstGeom prst="rect">
-            <a:avLst/>
-          </a:prstGeom>
-          <a:noFill/>
-          <a:extLst>
-            <a:ext uri="{909E8E84-426E-40DD-AFC4-6F175D3DCCD1}">
-              <a14:hiddenFill xmlns:a14="http://schemas.microsoft.com/office/drawing/2010/main">
-                <a:solidFill>
-                  <a:srgbClr val="FFFFFF"/>
-                </a:solidFill>
-              </a14:hiddenFill>
-            </a:ext>
-          </a:extLst>
-        </p:spPr>
-      </p:pic>
-      <p:pic>
-        <p:nvPicPr>
-          <p:cNvPr id="4" name="Imagem 3">
-            <a:extLst>
-              <a:ext uri="{FF2B5EF4-FFF2-40B4-BE49-F238E27FC236}">
-                <a16:creationId xmlns:a16="http://schemas.microsoft.com/office/drawing/2014/main" id="{8E2B5735-BA84-4183-AAAA-64068703005C}"/>
-              </a:ext>
-            </a:extLst>
-          </p:cNvPr>
-          <p:cNvPicPr>
-            <a:picLocks noChangeAspect="1"/>
-          </p:cNvPicPr>
-          <p:nvPr/>
-        </p:nvPicPr>
-        <p:blipFill>
-          <a:blip r:embed="rId3"/>
-          <a:stretch>
-            <a:fillRect/>
-          </a:stretch>
-        </p:blipFill>
-        <p:spPr>
-          <a:xfrm>
-            <a:off x="8136646" y="2263671"/>
-            <a:ext cx="3953792" cy="2840588"/>
-          </a:xfrm>
-          <a:prstGeom prst="rect">
-            <a:avLst/>
-          </a:prstGeom>
-        </p:spPr>
-      </p:pic>
-    </p:spTree>
-    <p:extLst>
-      <p:ext uri="{BB962C8B-B14F-4D97-AF65-F5344CB8AC3E}">
-        <p14:creationId xmlns:p14="http://schemas.microsoft.com/office/powerpoint/2010/main" val="2501451825"/>
       </p:ext>
     </p:extLst>
   </p:cSld>

</xml_diff>